<commit_message>
fix responsive design practice using replit
</commit_message>
<xml_diff>
--- a/Week08/ResponsiveDesign.pptx
+++ b/Week08/ResponsiveDesign.pptx
@@ -25,32 +25,32 @@
   <p:notesSz cx="6858000" cy="9144000"/>
   <p:embeddedFontLst>
     <p:embeddedFont>
-      <p:font typeface="Calibri" panose="020F0502020204030204" pitchFamily="34" charset="0"/>
+      <p:font typeface="Consolas" panose="020B0609020204030204" pitchFamily="49" charset="0"/>
       <p:regular r:id="rId15"/>
       <p:bold r:id="rId16"/>
       <p:italic r:id="rId17"/>
       <p:boldItalic r:id="rId18"/>
     </p:embeddedFont>
     <p:embeddedFont>
-      <p:font typeface="Consolas" panose="020B0609020204030204" pitchFamily="49" charset="0"/>
+      <p:font typeface="Krona One" panose="020B0604020202020204" charset="0"/>
       <p:regular r:id="rId19"/>
-      <p:bold r:id="rId20"/>
-      <p:italic r:id="rId21"/>
-      <p:boldItalic r:id="rId22"/>
-    </p:embeddedFont>
-    <p:embeddedFont>
-      <p:font typeface="Krona One" panose="020B0604020202020204" charset="0"/>
-      <p:regular r:id="rId23"/>
     </p:embeddedFont>
     <p:embeddedFont>
       <p:font typeface="Miriam Libre" panose="00000500000000000000" pitchFamily="2" charset="-79"/>
-      <p:regular r:id="rId24"/>
-      <p:bold r:id="rId25"/>
+      <p:regular r:id="rId20"/>
+      <p:bold r:id="rId21"/>
     </p:embeddedFont>
     <p:embeddedFont>
       <p:font typeface="Roboto Condensed Light" panose="02000000000000000000" pitchFamily="2" charset="0"/>
-      <p:regular r:id="rId26"/>
-      <p:italic r:id="rId27"/>
+      <p:regular r:id="rId22"/>
+      <p:italic r:id="rId23"/>
+    </p:embeddedFont>
+    <p:embeddedFont>
+      <p:font typeface="Segoe UI" panose="020B0502040204020203" pitchFamily="34" charset="0"/>
+      <p:regular r:id="rId24"/>
+      <p:bold r:id="rId25"/>
+      <p:italic r:id="rId26"/>
+      <p:boldItalic r:id="rId27"/>
     </p:embeddedFont>
   </p:embeddedFontLst>
   <p:defaultTextStyle>
@@ -6201,7 +6201,7 @@
           <a:p>
             <a:fld id="{5958763E-B898-436D-883D-03711491D54A}" type="datetimeFigureOut">
               <a:rPr lang="en-US" smtClean="0"/>
-              <a:t>2/9/2023</a:t>
+              <a:t>11/5/2024</a:t>
             </a:fld>
             <a:endParaRPr lang="en-US"/>
           </a:p>
@@ -13717,9 +13717,7 @@
             <a:r>
               <a:rPr lang="en-US" sz="3200" b="1" dirty="0">
                 <a:solidFill>
-                  <a:schemeClr val="bg2">
-                    <a:lumMod val="75000"/>
-                  </a:schemeClr>
+                  <a:schemeClr val="bg2"/>
                 </a:solidFill>
                 <a:hlinkClick r:id="rId3">
                   <a:extLst>
@@ -13734,9 +13732,7 @@
             <a:r>
               <a:rPr lang="en-US" sz="3200" b="1" dirty="0" err="1">
                 <a:solidFill>
-                  <a:schemeClr val="bg2">
-                    <a:lumMod val="75000"/>
-                  </a:schemeClr>
+                  <a:schemeClr val="bg2"/>
                 </a:solidFill>
                 <a:hlinkClick r:id="rId3">
                   <a:extLst>
@@ -13746,13 +13742,11 @@
                   </a:extLst>
                 </a:hlinkClick>
               </a:rPr>
-              <a:t>responsivedesignpractice</a:t>
+              <a:t>responsiveoregon</a:t>
             </a:r>
             <a:endParaRPr lang="en-US" sz="3200" b="1" dirty="0">
               <a:solidFill>
-                <a:schemeClr val="bg2">
-                  <a:lumMod val="75000"/>
-                </a:schemeClr>
+                <a:schemeClr val="bg2"/>
               </a:solidFill>
             </a:endParaRPr>
           </a:p>

</xml_diff>

<commit_message>
Update gitbook 2024-11-05 19:25:48
</commit_message>
<xml_diff>
--- a/Week08/ResponsiveDesign.pptx
+++ b/Week08/ResponsiveDesign.pptx
@@ -25,32 +25,32 @@
   <p:notesSz cx="6858000" cy="9144000"/>
   <p:embeddedFontLst>
     <p:embeddedFont>
-      <p:font typeface="Calibri" panose="020F0502020204030204" pitchFamily="34" charset="0"/>
+      <p:font typeface="Consolas" panose="020B0609020204030204" pitchFamily="49" charset="0"/>
       <p:regular r:id="rId15"/>
       <p:bold r:id="rId16"/>
       <p:italic r:id="rId17"/>
       <p:boldItalic r:id="rId18"/>
     </p:embeddedFont>
     <p:embeddedFont>
-      <p:font typeface="Consolas" panose="020B0609020204030204" pitchFamily="49" charset="0"/>
+      <p:font typeface="Krona One" panose="020B0604020202020204" charset="0"/>
       <p:regular r:id="rId19"/>
-      <p:bold r:id="rId20"/>
-      <p:italic r:id="rId21"/>
-      <p:boldItalic r:id="rId22"/>
-    </p:embeddedFont>
-    <p:embeddedFont>
-      <p:font typeface="Krona One" panose="020B0604020202020204" charset="0"/>
-      <p:regular r:id="rId23"/>
     </p:embeddedFont>
     <p:embeddedFont>
       <p:font typeface="Miriam Libre" panose="00000500000000000000" pitchFamily="2" charset="-79"/>
-      <p:regular r:id="rId24"/>
-      <p:bold r:id="rId25"/>
+      <p:regular r:id="rId20"/>
+      <p:bold r:id="rId21"/>
     </p:embeddedFont>
     <p:embeddedFont>
       <p:font typeface="Roboto Condensed Light" panose="02000000000000000000" pitchFamily="2" charset="0"/>
-      <p:regular r:id="rId26"/>
-      <p:italic r:id="rId27"/>
+      <p:regular r:id="rId22"/>
+      <p:italic r:id="rId23"/>
+    </p:embeddedFont>
+    <p:embeddedFont>
+      <p:font typeface="Segoe UI" panose="020B0502040204020203" pitchFamily="34" charset="0"/>
+      <p:regular r:id="rId24"/>
+      <p:bold r:id="rId25"/>
+      <p:italic r:id="rId26"/>
+      <p:boldItalic r:id="rId27"/>
     </p:embeddedFont>
   </p:embeddedFontLst>
   <p:defaultTextStyle>
@@ -6201,7 +6201,7 @@
           <a:p>
             <a:fld id="{5958763E-B898-436D-883D-03711491D54A}" type="datetimeFigureOut">
               <a:rPr lang="en-US" smtClean="0"/>
-              <a:t>2/9/2023</a:t>
+              <a:t>11/5/2024</a:t>
             </a:fld>
             <a:endParaRPr lang="en-US"/>
           </a:p>
@@ -13717,9 +13717,7 @@
             <a:r>
               <a:rPr lang="en-US" sz="3200" b="1" dirty="0">
                 <a:solidFill>
-                  <a:schemeClr val="bg2">
-                    <a:lumMod val="75000"/>
-                  </a:schemeClr>
+                  <a:schemeClr val="bg2"/>
                 </a:solidFill>
                 <a:hlinkClick r:id="rId3">
                   <a:extLst>
@@ -13734,9 +13732,7 @@
             <a:r>
               <a:rPr lang="en-US" sz="3200" b="1" dirty="0" err="1">
                 <a:solidFill>
-                  <a:schemeClr val="bg2">
-                    <a:lumMod val="75000"/>
-                  </a:schemeClr>
+                  <a:schemeClr val="bg2"/>
                 </a:solidFill>
                 <a:hlinkClick r:id="rId3">
                   <a:extLst>
@@ -13746,13 +13742,11 @@
                   </a:extLst>
                 </a:hlinkClick>
               </a:rPr>
-              <a:t>responsivedesignpractice</a:t>
+              <a:t>responsiveoregon</a:t>
             </a:r>
             <a:endParaRPr lang="en-US" sz="3200" b="1" dirty="0">
               <a:solidFill>
-                <a:schemeClr val="bg2">
-                  <a:lumMod val="75000"/>
-                </a:schemeClr>
+                <a:schemeClr val="bg2"/>
               </a:solidFill>
             </a:endParaRPr>
           </a:p>

</xml_diff>